<commit_message>
Updates for how to use EB.
</commit_message>
<xml_diff>
--- a/Slides/Elastic Beanstalk.pptx
+++ b/Slides/Elastic Beanstalk.pptx
@@ -13,9 +13,10 @@
     <p:sldId id="260" r:id="rId7"/>
     <p:sldId id="262" r:id="rId8"/>
     <p:sldId id="258" r:id="rId9"/>
-    <p:sldId id="261" r:id="rId10"/>
-    <p:sldId id="264" r:id="rId11"/>
-    <p:sldId id="263" r:id="rId12"/>
+    <p:sldId id="267" r:id="rId10"/>
+    <p:sldId id="261" r:id="rId11"/>
+    <p:sldId id="264" r:id="rId12"/>
+    <p:sldId id="263" r:id="rId13"/>
   </p:sldIdLst>
   <p:sldSz cx="12192000" cy="6858000"/>
   <p:notesSz cx="6858000" cy="9144000"/>
@@ -114,6 +115,11 @@
       </a:defRPr>
     </a:lvl9pPr>
   </p:defaultTextStyle>
+  <p:extLst>
+    <p:ext uri="{EFAFB233-063F-42B5-8137-9DF3F51BA10A}">
+      <p15:sldGuideLst xmlns:p15="http://schemas.microsoft.com/office/powerpoint/2012/main"/>
+    </p:ext>
+  </p:extLst>
 </p:presentation>
 </file>
 
@@ -370,7 +376,7 @@
           <a:p>
             <a:fld id="{1D6FFD96-0DFC-2941-B520-D15EC4A7F8EC}" type="datetimeFigureOut">
               <a:rPr lang="en-US" smtClean="0"/>
-              <a:t>12/4/25</a:t>
+              <a:t>12/5/25</a:t>
             </a:fld>
             <a:endParaRPr lang="en-US"/>
           </a:p>
@@ -536,7 +542,7 @@
           <a:p>
             <a:fld id="{1D6FFD96-0DFC-2941-B520-D15EC4A7F8EC}" type="datetimeFigureOut">
               <a:rPr lang="en-US" smtClean="0"/>
-              <a:t>12/4/25</a:t>
+              <a:t>12/5/25</a:t>
             </a:fld>
             <a:endParaRPr lang="en-US"/>
           </a:p>
@@ -835,7 +841,7 @@
             <a:fld id="{59E145AF-2465-1345-A673-F2664B07CED8}" type="datetime5">
               <a:rPr lang="en-US" smtClean="0"/>
               <a:pPr/>
-              <a:t>4-Dec-25</a:t>
+              <a:t>5-Dec-25</a:t>
             </a:fld>
             <a:endParaRPr lang="en-US" dirty="0"/>
           </a:p>
@@ -1082,7 +1088,7 @@
             <a:fld id="{59E145AF-2465-1345-A673-F2664B07CED8}" type="datetime5">
               <a:rPr lang="en-US" smtClean="0"/>
               <a:pPr/>
-              <a:t>4-Dec-25</a:t>
+              <a:t>5-Dec-25</a:t>
             </a:fld>
             <a:endParaRPr lang="en-US" dirty="0"/>
           </a:p>
@@ -1371,7 +1377,7 @@
             <a:fld id="{59E145AF-2465-1345-A673-F2664B07CED8}" type="datetime5">
               <a:rPr lang="en-US" smtClean="0"/>
               <a:pPr/>
-              <a:t>4-Dec-25</a:t>
+              <a:t>5-Dec-25</a:t>
             </a:fld>
             <a:endParaRPr lang="en-US" dirty="0"/>
           </a:p>
@@ -1727,7 +1733,7 @@
             <a:fld id="{59E145AF-2465-1345-A673-F2664B07CED8}" type="datetime5">
               <a:rPr lang="en-US" smtClean="0"/>
               <a:pPr/>
-              <a:t>4-Dec-25</a:t>
+              <a:t>5-Dec-25</a:t>
             </a:fld>
             <a:endParaRPr lang="en-US" dirty="0"/>
           </a:p>
@@ -1927,7 +1933,7 @@
             <a:fld id="{59E145AF-2465-1345-A673-F2664B07CED8}" type="datetime5">
               <a:rPr lang="en-US" smtClean="0"/>
               <a:pPr/>
-              <a:t>4-Dec-25</a:t>
+              <a:t>5-Dec-25</a:t>
             </a:fld>
             <a:endParaRPr lang="en-US" dirty="0"/>
           </a:p>
@@ -2016,7 +2022,7 @@
           <a:p>
             <a:fld id="{1D6FFD96-0DFC-2941-B520-D15EC4A7F8EC}" type="datetimeFigureOut">
               <a:rPr lang="en-US" smtClean="0"/>
-              <a:t>12/4/25</a:t>
+              <a:t>12/5/25</a:t>
             </a:fld>
             <a:endParaRPr lang="en-US"/>
           </a:p>
@@ -2134,7 +2140,7 @@
           <a:p>
             <a:fld id="{1D6FFD96-0DFC-2941-B520-D15EC4A7F8EC}" type="datetimeFigureOut">
               <a:rPr lang="en-US" smtClean="0"/>
-              <a:t>12/4/25</a:t>
+              <a:t>12/5/25</a:t>
             </a:fld>
             <a:endParaRPr lang="en-US"/>
           </a:p>
@@ -2996,13 +3002,13 @@
   <p:clrMapOvr>
     <a:masterClrMapping/>
   </p:clrMapOvr>
-  <mc:AlternateContent xmlns:mc="http://schemas.openxmlformats.org/markup-compatibility/2006">
-    <mc:Choice xmlns:p14="http://schemas.microsoft.com/office/powerpoint/2010/main" Requires="p14">
+  <mc:AlternateContent xmlns:mc="http://schemas.openxmlformats.org/markup-compatibility/2006" xmlns:p14="http://schemas.microsoft.com/office/powerpoint/2010/main">
+    <mc:Choice Requires="p14">
       <p:transition spd="slow" p14:dur="1200">
         <p14:prism/>
       </p:transition>
     </mc:Choice>
-    <mc:Fallback>
+    <mc:Fallback xmlns="">
       <p:transition spd="slow">
         <p:fade/>
       </p:transition>
@@ -3033,6 +3039,121 @@
           <p:cNvPr id="2" name="Title 1">
             <a:extLst>
               <a:ext uri="{FF2B5EF4-FFF2-40B4-BE49-F238E27FC236}">
+                <a16:creationId xmlns:a16="http://schemas.microsoft.com/office/drawing/2014/main" id="{737971D2-3F51-0C85-4FDA-3909113CF7D3}"/>
+              </a:ext>
+            </a:extLst>
+          </p:cNvPr>
+          <p:cNvSpPr>
+            <a:spLocks noGrp="1"/>
+          </p:cNvSpPr>
+          <p:nvPr>
+            <p:ph type="title"/>
+          </p:nvPr>
+        </p:nvSpPr>
+        <p:spPr/>
+        <p:txBody>
+          <a:bodyPr/>
+          <a:lstStyle/>
+          <a:p>
+            <a:r>
+              <a:rPr lang="en-US" dirty="0"/>
+              <a:t>Finally</a:t>
+            </a:r>
+          </a:p>
+        </p:txBody>
+      </p:sp>
+      <p:sp>
+        <p:nvSpPr>
+          <p:cNvPr id="3" name="Content Placeholder 2">
+            <a:extLst>
+              <a:ext uri="{FF2B5EF4-FFF2-40B4-BE49-F238E27FC236}">
+                <a16:creationId xmlns:a16="http://schemas.microsoft.com/office/drawing/2014/main" id="{5F12A373-4B4C-EEBB-2831-FF1B7E00E38A}"/>
+              </a:ext>
+            </a:extLst>
+          </p:cNvPr>
+          <p:cNvSpPr>
+            <a:spLocks noGrp="1"/>
+          </p:cNvSpPr>
+          <p:nvPr>
+            <p:ph idx="1"/>
+          </p:nvPr>
+        </p:nvSpPr>
+        <p:spPr/>
+        <p:txBody>
+          <a:bodyPr/>
+          <a:lstStyle/>
+          <a:p>
+            <a:r>
+              <a:rPr lang="en-US" sz="1600" dirty="0"/>
+              <a:t>2025-12-05 17:26:25    INFO    Instance deployment completed successfully.</a:t>
+            </a:r>
+          </a:p>
+          <a:p>
+            <a:r>
+              <a:rPr lang="en-US" sz="1600" dirty="0"/>
+              <a:t>2025-12-05 17:26:29    INFO    Application available at production-env.eba-ajhunfdw.us-west-2.elasticbeanstalk.com.</a:t>
+            </a:r>
+          </a:p>
+          <a:p>
+            <a:r>
+              <a:rPr lang="en-US" sz="1600" dirty="0"/>
+              <a:t>2025-12-05 17:26:30    INFO    Successfully launched environment: production-env</a:t>
+            </a:r>
+          </a:p>
+          <a:p>
+            <a:endParaRPr lang="en-US" dirty="0"/>
+          </a:p>
+          <a:p>
+            <a:r>
+              <a:rPr lang="en-US" dirty="0"/>
+              <a:t>$ </a:t>
+            </a:r>
+            <a:r>
+              <a:rPr lang="en-US" dirty="0" err="1"/>
+              <a:t>eb</a:t>
+            </a:r>
+            <a:r>
+              <a:rPr lang="en-US" dirty="0"/>
+              <a:t> open</a:t>
+            </a:r>
+          </a:p>
+        </p:txBody>
+      </p:sp>
+    </p:spTree>
+    <p:extLst>
+      <p:ext uri="{BB962C8B-B14F-4D97-AF65-F5344CB8AC3E}">
+        <p14:creationId xmlns:p14="http://schemas.microsoft.com/office/powerpoint/2010/main" val="2450712142"/>
+      </p:ext>
+    </p:extLst>
+  </p:cSld>
+  <p:clrMapOvr>
+    <a:masterClrMapping/>
+  </p:clrMapOvr>
+</p:sld>
+</file>
+
+<file path=ppt/slides/slide11.xml><?xml version="1.0" encoding="utf-8"?>
+<p:sld xmlns:a="http://schemas.openxmlformats.org/drawingml/2006/main" xmlns:r="http://schemas.openxmlformats.org/officeDocument/2006/relationships" xmlns:p="http://schemas.openxmlformats.org/presentationml/2006/main">
+  <p:cSld>
+    <p:spTree>
+      <p:nvGrpSpPr>
+        <p:cNvPr id="1" name=""/>
+        <p:cNvGrpSpPr/>
+        <p:nvPr/>
+      </p:nvGrpSpPr>
+      <p:grpSpPr>
+        <a:xfrm>
+          <a:off x="0" y="0"/>
+          <a:ext cx="0" cy="0"/>
+          <a:chOff x="0" y="0"/>
+          <a:chExt cx="0" cy="0"/>
+        </a:xfrm>
+      </p:grpSpPr>
+      <p:sp>
+        <p:nvSpPr>
+          <p:cNvPr id="2" name="Title 1">
+            <a:extLst>
+              <a:ext uri="{FF2B5EF4-FFF2-40B4-BE49-F238E27FC236}">
                 <a16:creationId xmlns:a16="http://schemas.microsoft.com/office/drawing/2014/main" id="{46911603-3EA8-ED77-4118-DEEC19B6EFE9}"/>
               </a:ext>
             </a:extLst>
@@ -3079,7 +3200,7 @@
           <a:p>
             <a:r>
               <a:rPr lang="en-US" dirty="0"/>
-              <a:t>$ git commit –m “…”</a:t>
+              <a:t>$ git commit –am “…”</a:t>
             </a:r>
           </a:p>
           <a:p>
@@ -3099,16 +3220,13 @@
           <a:p>
             <a:r>
               <a:rPr lang="en-US" dirty="0"/>
-              <a:t>$ </a:t>
-            </a:r>
-            <a:r>
-              <a:rPr lang="en-US" dirty="0" err="1"/>
-              <a:t>eb</a:t>
-            </a:r>
-            <a:r>
-              <a:rPr lang="en-US" dirty="0"/>
-              <a:t> open</a:t>
-            </a:r>
+              <a:t># Refresh </a:t>
+            </a:r>
+            <a:r>
+              <a:rPr lang="en-US"/>
+              <a:t>browser page</a:t>
+            </a:r>
+            <a:endParaRPr lang="en-US" dirty="0"/>
           </a:p>
         </p:txBody>
       </p:sp>
@@ -3125,7 +3243,7 @@
 </p:sld>
 </file>
 
-<file path=ppt/slides/slide11.xml><?xml version="1.0" encoding="utf-8"?>
+<file path=ppt/slides/slide12.xml><?xml version="1.0" encoding="utf-8"?>
 <p:sld xmlns:a="http://schemas.openxmlformats.org/drawingml/2006/main" xmlns:r="http://schemas.openxmlformats.org/officeDocument/2006/relationships" xmlns:p="http://schemas.openxmlformats.org/presentationml/2006/main">
   <p:cSld>
     <p:spTree>
@@ -3446,15 +3564,6 @@
           <a:solidFill>
             <a:srgbClr val="FFFFFF"/>
           </a:solidFill>
-          <a:extLst>
-            <a:ext uri="{909E8E84-426E-40DD-AFC4-6F175D3DCCD1}">
-              <a14:hiddenFill xmlns:a14="http://schemas.microsoft.com/office/drawing/2010/main">
-                <a:solidFill>
-                  <a:srgbClr val="FFFFFF"/>
-                </a:solidFill>
-              </a14:hiddenFill>
-            </a:ext>
-          </a:extLst>
         </p:spPr>
       </p:pic>
     </p:spTree>
@@ -4364,7 +4473,7 @@
           <p:cNvPr id="2" name="Title 1">
             <a:extLst>
               <a:ext uri="{FF2B5EF4-FFF2-40B4-BE49-F238E27FC236}">
-                <a16:creationId xmlns:a16="http://schemas.microsoft.com/office/drawing/2014/main" id="{737971D2-3F51-0C85-4FDA-3909113CF7D3}"/>
+                <a16:creationId xmlns:a16="http://schemas.microsoft.com/office/drawing/2014/main" id="{677AD01A-1406-37BF-A63C-E2654A655424}"/>
               </a:ext>
             </a:extLst>
           </p:cNvPr>
@@ -4382,51 +4491,44 @@
           <a:p>
             <a:r>
               <a:rPr lang="en-US" dirty="0"/>
-              <a:t>Finally</a:t>
-            </a:r>
-          </a:p>
-        </p:txBody>
-      </p:sp>
-      <p:sp>
-        <p:nvSpPr>
-          <p:cNvPr id="3" name="Content Placeholder 2">
+              <a:t>Git Some Coffee or Espresso</a:t>
+            </a:r>
+          </a:p>
+        </p:txBody>
+      </p:sp>
+      <p:pic>
+        <p:nvPicPr>
+          <p:cNvPr id="5" name="Content Placeholder 4" descr="Cropped hand of barista pouring milk into cappuccino to create leaf pattern">
             <a:extLst>
               <a:ext uri="{FF2B5EF4-FFF2-40B4-BE49-F238E27FC236}">
-                <a16:creationId xmlns:a16="http://schemas.microsoft.com/office/drawing/2014/main" id="{5F12A373-4B4C-EEBB-2831-FF1B7E00E38A}"/>
+                <a16:creationId xmlns:a16="http://schemas.microsoft.com/office/drawing/2014/main" id="{550912DC-8F2A-C521-89B3-D332A0AB3959}"/>
               </a:ext>
             </a:extLst>
           </p:cNvPr>
-          <p:cNvSpPr>
-            <a:spLocks noGrp="1"/>
-          </p:cNvSpPr>
+          <p:cNvPicPr>
+            <a:picLocks noGrp="1" noChangeAspect="1"/>
+          </p:cNvPicPr>
           <p:nvPr>
             <p:ph idx="1"/>
           </p:nvPr>
-        </p:nvSpPr>
-        <p:spPr/>
-        <p:txBody>
-          <a:bodyPr/>
-          <a:lstStyle/>
-          <a:p>
-            <a:r>
-              <a:rPr lang="en-US" dirty="0"/>
-              <a:t>$ </a:t>
-            </a:r>
-            <a:r>
-              <a:rPr lang="en-US" dirty="0" err="1"/>
-              <a:t>eb</a:t>
-            </a:r>
-            <a:r>
-              <a:rPr lang="en-US" dirty="0"/>
-              <a:t> open</a:t>
-            </a:r>
-          </a:p>
-        </p:txBody>
-      </p:sp>
+        </p:nvPicPr>
+        <p:blipFill>
+          <a:blip r:embed="rId2"/>
+          <a:stretch>
+            <a:fillRect/>
+          </a:stretch>
+        </p:blipFill>
+        <p:spPr>
+          <a:xfrm>
+            <a:off x="2701528" y="1600200"/>
+            <a:ext cx="6788944" cy="4525963"/>
+          </a:xfrm>
+        </p:spPr>
+      </p:pic>
     </p:spTree>
     <p:extLst>
       <p:ext uri="{BB962C8B-B14F-4D97-AF65-F5344CB8AC3E}">
-        <p14:creationId xmlns:p14="http://schemas.microsoft.com/office/powerpoint/2010/main" val="2450712142"/>
+        <p14:creationId xmlns:p14="http://schemas.microsoft.com/office/powerpoint/2010/main" val="3225088754"/>
       </p:ext>
     </p:extLst>
   </p:cSld>

</xml_diff>